<commit_message>
updated diagrams and docs
</commit_message>
<xml_diff>
--- a/diagrams/adatbazis.pptx
+++ b/diagrams/adatbazis.pptx
@@ -259,7 +259,7 @@
           <a:p>
             <a:fld id="{0D165520-D099-4B55-9FA4-2C28BFF9116C}" type="datetimeFigureOut">
               <a:rPr lang="hu-HU" smtClean="0"/>
-              <a:t>2022. 01. 31.</a:t>
+              <a:t>2022. 03. 26.</a:t>
             </a:fld>
             <a:endParaRPr lang="hu-HU"/>
           </a:p>
@@ -457,7 +457,7 @@
           <a:p>
             <a:fld id="{0D165520-D099-4B55-9FA4-2C28BFF9116C}" type="datetimeFigureOut">
               <a:rPr lang="hu-HU" smtClean="0"/>
-              <a:t>2022. 01. 31.</a:t>
+              <a:t>2022. 03. 26.</a:t>
             </a:fld>
             <a:endParaRPr lang="hu-HU"/>
           </a:p>
@@ -665,7 +665,7 @@
           <a:p>
             <a:fld id="{0D165520-D099-4B55-9FA4-2C28BFF9116C}" type="datetimeFigureOut">
               <a:rPr lang="hu-HU" smtClean="0"/>
-              <a:t>2022. 01. 31.</a:t>
+              <a:t>2022. 03. 26.</a:t>
             </a:fld>
             <a:endParaRPr lang="hu-HU"/>
           </a:p>
@@ -863,7 +863,7 @@
           <a:p>
             <a:fld id="{0D165520-D099-4B55-9FA4-2C28BFF9116C}" type="datetimeFigureOut">
               <a:rPr lang="hu-HU" smtClean="0"/>
-              <a:t>2022. 01. 31.</a:t>
+              <a:t>2022. 03. 26.</a:t>
             </a:fld>
             <a:endParaRPr lang="hu-HU"/>
           </a:p>
@@ -1138,7 +1138,7 @@
           <a:p>
             <a:fld id="{0D165520-D099-4B55-9FA4-2C28BFF9116C}" type="datetimeFigureOut">
               <a:rPr lang="hu-HU" smtClean="0"/>
-              <a:t>2022. 01. 31.</a:t>
+              <a:t>2022. 03. 26.</a:t>
             </a:fld>
             <a:endParaRPr lang="hu-HU"/>
           </a:p>
@@ -1403,7 +1403,7 @@
           <a:p>
             <a:fld id="{0D165520-D099-4B55-9FA4-2C28BFF9116C}" type="datetimeFigureOut">
               <a:rPr lang="hu-HU" smtClean="0"/>
-              <a:t>2022. 01. 31.</a:t>
+              <a:t>2022. 03. 26.</a:t>
             </a:fld>
             <a:endParaRPr lang="hu-HU"/>
           </a:p>
@@ -1815,7 +1815,7 @@
           <a:p>
             <a:fld id="{0D165520-D099-4B55-9FA4-2C28BFF9116C}" type="datetimeFigureOut">
               <a:rPr lang="hu-HU" smtClean="0"/>
-              <a:t>2022. 01. 31.</a:t>
+              <a:t>2022. 03. 26.</a:t>
             </a:fld>
             <a:endParaRPr lang="hu-HU"/>
           </a:p>
@@ -1956,7 +1956,7 @@
           <a:p>
             <a:fld id="{0D165520-D099-4B55-9FA4-2C28BFF9116C}" type="datetimeFigureOut">
               <a:rPr lang="hu-HU" smtClean="0"/>
-              <a:t>2022. 01. 31.</a:t>
+              <a:t>2022. 03. 26.</a:t>
             </a:fld>
             <a:endParaRPr lang="hu-HU"/>
           </a:p>
@@ -2069,7 +2069,7 @@
           <a:p>
             <a:fld id="{0D165520-D099-4B55-9FA4-2C28BFF9116C}" type="datetimeFigureOut">
               <a:rPr lang="hu-HU" smtClean="0"/>
-              <a:t>2022. 01. 31.</a:t>
+              <a:t>2022. 03. 26.</a:t>
             </a:fld>
             <a:endParaRPr lang="hu-HU"/>
           </a:p>
@@ -2380,7 +2380,7 @@
           <a:p>
             <a:fld id="{0D165520-D099-4B55-9FA4-2C28BFF9116C}" type="datetimeFigureOut">
               <a:rPr lang="hu-HU" smtClean="0"/>
-              <a:t>2022. 01. 31.</a:t>
+              <a:t>2022. 03. 26.</a:t>
             </a:fld>
             <a:endParaRPr lang="hu-HU"/>
           </a:p>
@@ -2668,7 +2668,7 @@
           <a:p>
             <a:fld id="{0D165520-D099-4B55-9FA4-2C28BFF9116C}" type="datetimeFigureOut">
               <a:rPr lang="hu-HU" smtClean="0"/>
-              <a:t>2022. 01. 31.</a:t>
+              <a:t>2022. 03. 26.</a:t>
             </a:fld>
             <a:endParaRPr lang="hu-HU"/>
           </a:p>
@@ -2909,7 +2909,7 @@
           <a:p>
             <a:fld id="{0D165520-D099-4B55-9FA4-2C28BFF9116C}" type="datetimeFigureOut">
               <a:rPr lang="hu-HU" smtClean="0"/>
-              <a:t>2022. 01. 31.</a:t>
+              <a:t>2022. 03. 26.</a:t>
             </a:fld>
             <a:endParaRPr lang="hu-HU"/>
           </a:p>
@@ -4079,7 +4079,7 @@
         </p:nvSpPr>
         <p:spPr>
           <a:xfrm>
-            <a:off x="3121691" y="6091476"/>
+            <a:off x="2248122" y="6141595"/>
             <a:ext cx="1147010" cy="537410"/>
           </a:xfrm>
           <a:prstGeom prst="ellipse">
@@ -4139,7 +4139,7 @@
         </p:nvSpPr>
         <p:spPr>
           <a:xfrm>
-            <a:off x="4402068" y="6087469"/>
+            <a:off x="3453283" y="6136106"/>
             <a:ext cx="1251289" cy="537410"/>
           </a:xfrm>
           <a:prstGeom prst="ellipse">
@@ -4199,7 +4199,7 @@
         </p:nvSpPr>
         <p:spPr>
           <a:xfrm>
-            <a:off x="5803210" y="6091475"/>
+            <a:off x="4756211" y="6147552"/>
             <a:ext cx="1251289" cy="537410"/>
           </a:xfrm>
           <a:prstGeom prst="ellipse">
@@ -4263,8 +4263,8 @@
         </p:nvCxnSpPr>
         <p:spPr>
           <a:xfrm flipH="1">
-            <a:off x="3695196" y="5646822"/>
-            <a:ext cx="2400803" cy="444654"/>
+            <a:off x="2821627" y="5646822"/>
+            <a:ext cx="3274372" cy="494773"/>
           </a:xfrm>
           <a:prstGeom prst="straightConnector1">
             <a:avLst/>
@@ -4306,8 +4306,8 @@
         </p:nvCxnSpPr>
         <p:spPr>
           <a:xfrm flipH="1">
-            <a:off x="5027713" y="5646822"/>
-            <a:ext cx="1068286" cy="440647"/>
+            <a:off x="4078928" y="5646822"/>
+            <a:ext cx="2017071" cy="489284"/>
           </a:xfrm>
           <a:prstGeom prst="straightConnector1">
             <a:avLst/>
@@ -4348,9 +4348,9 @@
           <p:nvPr/>
         </p:nvCxnSpPr>
         <p:spPr>
-          <a:xfrm>
-            <a:off x="6095999" y="5646822"/>
-            <a:ext cx="332856" cy="444653"/>
+          <a:xfrm flipH="1">
+            <a:off x="5381856" y="5646822"/>
+            <a:ext cx="714143" cy="500730"/>
           </a:xfrm>
           <a:prstGeom prst="straightConnector1">
             <a:avLst/>
@@ -5876,7 +5876,7 @@
         </p:nvSpPr>
         <p:spPr>
           <a:xfrm>
-            <a:off x="7186859" y="6096507"/>
+            <a:off x="6065651" y="6136106"/>
             <a:ext cx="1251289" cy="537410"/>
           </a:xfrm>
           <a:prstGeom prst="ellipse">
@@ -5941,7 +5941,7 @@
         <p:spPr>
           <a:xfrm>
             <a:off x="6095999" y="5646822"/>
-            <a:ext cx="1716505" cy="449685"/>
+            <a:ext cx="595297" cy="489284"/>
           </a:xfrm>
           <a:prstGeom prst="straightConnector1">
             <a:avLst/>
@@ -7592,6 +7592,109 @@
           <a:xfrm flipV="1">
             <a:off x="6565230" y="3012155"/>
             <a:ext cx="1099889" cy="2365962"/>
+          </a:xfrm>
+          <a:prstGeom prst="straightConnector1">
+            <a:avLst/>
+          </a:prstGeom>
+          <a:ln>
+            <a:tailEnd type="triangle"/>
+          </a:ln>
+        </p:spPr>
+        <p:style>
+          <a:lnRef idx="3">
+            <a:schemeClr val="dk1"/>
+          </a:lnRef>
+          <a:fillRef idx="0">
+            <a:schemeClr val="dk1"/>
+          </a:fillRef>
+          <a:effectRef idx="2">
+            <a:schemeClr val="dk1"/>
+          </a:effectRef>
+          <a:fontRef idx="minor">
+            <a:schemeClr val="tx1"/>
+          </a:fontRef>
+        </p:style>
+      </p:cxnSp>
+      <p:sp>
+        <p:nvSpPr>
+          <p:cNvPr id="112" name="Ellipszis 111">
+            <a:extLst>
+              <a:ext uri="{FF2B5EF4-FFF2-40B4-BE49-F238E27FC236}">
+                <a16:creationId xmlns:a16="http://schemas.microsoft.com/office/drawing/2014/main" id="{315C64FA-03FD-449F-BC90-55D856FEB59E}"/>
+              </a:ext>
+            </a:extLst>
+          </p:cNvPr>
+          <p:cNvSpPr/>
+          <p:nvPr/>
+        </p:nvSpPr>
+        <p:spPr>
+          <a:xfrm>
+            <a:off x="7394263" y="6150141"/>
+            <a:ext cx="1251289" cy="537410"/>
+          </a:xfrm>
+          <a:prstGeom prst="ellipse">
+            <a:avLst/>
+          </a:prstGeom>
+          <a:noFill/>
+          <a:ln w="9525" cap="flat" cmpd="sng" algn="ctr">
+            <a:solidFill>
+              <a:schemeClr val="dk1"/>
+            </a:solidFill>
+            <a:prstDash val="solid"/>
+            <a:round/>
+            <a:headEnd type="none" w="med" len="med"/>
+            <a:tailEnd type="none" w="med" len="med"/>
+          </a:ln>
+        </p:spPr>
+        <p:style>
+          <a:lnRef idx="0">
+            <a:scrgbClr r="0" g="0" b="0"/>
+          </a:lnRef>
+          <a:fillRef idx="0">
+            <a:scrgbClr r="0" g="0" b="0"/>
+          </a:fillRef>
+          <a:effectRef idx="0">
+            <a:scrgbClr r="0" g="0" b="0"/>
+          </a:effectRef>
+          <a:fontRef idx="minor">
+            <a:schemeClr val="dk1"/>
+          </a:fontRef>
+        </p:style>
+        <p:txBody>
+          <a:bodyPr rtlCol="0" anchor="ctr"/>
+          <a:lstStyle/>
+          <a:p>
+            <a:pPr algn="ctr"/>
+            <a:r>
+              <a:rPr lang="hu-HU" sz="1200" dirty="0">
+                <a:latin typeface="Times New Roman" panose="02020603050405020304" pitchFamily="18" charset="0"/>
+                <a:cs typeface="Times New Roman" panose="02020603050405020304" pitchFamily="18" charset="0"/>
+              </a:rPr>
+              <a:t>gameDesc</a:t>
+            </a:r>
+          </a:p>
+        </p:txBody>
+      </p:sp>
+      <p:cxnSp>
+        <p:nvCxnSpPr>
+          <p:cNvPr id="113" name="Egyenes összekötő nyíllal 112">
+            <a:extLst>
+              <a:ext uri="{FF2B5EF4-FFF2-40B4-BE49-F238E27FC236}">
+                <a16:creationId xmlns:a16="http://schemas.microsoft.com/office/drawing/2014/main" id="{6368CDEA-A20D-4235-9456-BC37AACC3525}"/>
+              </a:ext>
+            </a:extLst>
+          </p:cNvPr>
+          <p:cNvCxnSpPr>
+            <a:cxnSpLocks/>
+            <a:stCxn id="31" idx="2"/>
+            <a:endCxn id="112" idx="0"/>
+          </p:cNvCxnSpPr>
+          <p:nvPr/>
+        </p:nvCxnSpPr>
+        <p:spPr>
+          <a:xfrm>
+            <a:off x="6095999" y="5646822"/>
+            <a:ext cx="1923909" cy="503319"/>
           </a:xfrm>
           <a:prstGeom prst="straightConnector1">
             <a:avLst/>

</xml_diff>